<commit_message>
[master] last minutye update to lesson 11
</commit_message>
<xml_diff>
--- a/theory_11-usability_evaluation/theory_11-usability_evaluation.pptx
+++ b/theory_11-usability_evaluation/theory_11-usability_evaluation.pptx
@@ -22,9 +22,9 @@
     <p:sldId id="437" r:id="rId13"/>
     <p:sldId id="421" r:id="rId14"/>
     <p:sldId id="423" r:id="rId15"/>
-    <p:sldId id="447" r:id="rId16"/>
-    <p:sldId id="448" r:id="rId17"/>
-    <p:sldId id="446" r:id="rId18"/>
+    <p:sldId id="446" r:id="rId16"/>
+    <p:sldId id="447" r:id="rId17"/>
+    <p:sldId id="448" r:id="rId18"/>
     <p:sldId id="465" r:id="rId19"/>
     <p:sldId id="466" r:id="rId20"/>
     <p:sldId id="442" r:id="rId21"/>
@@ -234,7 +234,7 @@
           <a:p>
             <a:fld id="{251090E0-FB0C-49E9-9864-9F53EABEA96F}" type="datetimeFigureOut">
               <a:rPr lang="en-GB" smtClean="0"/>
-              <a:t>04/05/2024</a:t>
+              <a:t>06/05/2024</a:t>
             </a:fld>
             <a:endParaRPr lang="en-GB"/>
           </a:p>
@@ -2573,7 +2573,7 @@
         </p:spPr>
         <p:txBody>
           <a:bodyPr>
-            <a:normAutofit fontScale="92500" lnSpcReduction="20000"/>
+            <a:normAutofit/>
           </a:bodyPr>
           <a:lstStyle/>
           <a:p>
@@ -2641,27 +2641,6 @@
             </a:r>
           </a:p>
           <a:p>
-            <a:pPr lvl="1"/>
-            <a:r>
-              <a:rPr lang="en-GB" dirty="0"/>
-              <a:t>Content validity</a:t>
-            </a:r>
-          </a:p>
-          <a:p>
-            <a:pPr lvl="1"/>
-            <a:r>
-              <a:rPr lang="en-GB" dirty="0"/>
-              <a:t>Criterion-related validity</a:t>
-            </a:r>
-          </a:p>
-          <a:p>
-            <a:pPr lvl="1"/>
-            <a:r>
-              <a:rPr lang="en-GB" dirty="0"/>
-              <a:t>Construct validity</a:t>
-            </a:r>
-          </a:p>
-          <a:p>
             <a:endParaRPr lang="en-GB" dirty="0"/>
           </a:p>
           <a:p>
@@ -2682,14 +2661,9 @@
             </a:r>
           </a:p>
           <a:p>
-            <a:pPr lvl="1"/>
-            <a:r>
-              <a:rPr lang="en-GB" dirty="0"/>
-              <a:t>There is no direct measurement of sensitivity.</a:t>
-            </a:r>
-          </a:p>
-          <a:p>
-            <a:pPr lvl="1"/>
+            <a:pPr marL="457200" lvl="1" indent="0">
+              <a:buNone/>
+            </a:pPr>
             <a:endParaRPr lang="en-GB" dirty="0"/>
           </a:p>
         </p:txBody>
@@ -4011,19 +3985,11 @@
           <a:p>
             <a:r>
               <a:rPr lang="it-IT" dirty="0" err="1"/>
-              <a:t>Psychometric</a:t>
+              <a:t>Example</a:t>
             </a:r>
             <a:r>
               <a:rPr lang="it-IT" dirty="0"/>
-              <a:t> </a:t>
-            </a:r>
-            <a:r>
-              <a:rPr lang="it-IT" dirty="0" err="1"/>
-              <a:t>evaluation</a:t>
-            </a:r>
-            <a:r>
-              <a:rPr lang="it-IT" dirty="0"/>
-              <a:t> of SUS</a:t>
+              <a:t> – Overall SUS</a:t>
             </a:r>
             <a:endParaRPr lang="en-GB" dirty="0"/>
           </a:p>
@@ -4076,83 +4042,590 @@
         </p:nvSpPr>
         <p:spPr>
           <a:xfrm>
-            <a:off x="551214" y="1240077"/>
-            <a:ext cx="10920349" cy="5481398"/>
+            <a:off x="297383" y="1243107"/>
+            <a:ext cx="5059876" cy="5295805"/>
           </a:xfrm>
         </p:spPr>
         <p:txBody>
           <a:bodyPr>
-            <a:normAutofit/>
+            <a:normAutofit fontScale="85000" lnSpcReduction="20000"/>
           </a:bodyPr>
           <a:lstStyle/>
           <a:p>
             <a:r>
               <a:rPr lang="en-GB" dirty="0"/>
-              <a:t>According to an investigation of the psychometric properties of the SUS (from 2324 SUS questionnaires), </a:t>
+              <a:t>For items 1, 3, 5, 7, and 9 (the positively worded items) the score contribution is the scale position minus 1:</a:t>
+            </a:r>
+          </a:p>
+          <a:p>
+            <a:endParaRPr lang="en-GB" dirty="0"/>
+          </a:p>
+          <a:p>
+            <a:pPr marL="0" indent="0">
+              <a:buNone/>
+            </a:pPr>
+            <a:r>
+              <a:rPr lang="en-GB" dirty="0"/>
+              <a:t>(3-1) + (4-1) + (4-1) + (3-1) + (5-1) = 16</a:t>
+            </a:r>
+          </a:p>
+          <a:p>
+            <a:endParaRPr lang="en-GB" dirty="0"/>
+          </a:p>
+          <a:p>
+            <a:r>
+              <a:rPr lang="en-GB" dirty="0"/>
+              <a:t>For items 2, 4, 6, 8, and 10 (the negatively worded items), the contribution is 5 minus the scale position:</a:t>
+            </a:r>
+          </a:p>
+          <a:p>
+            <a:pPr marL="0" indent="0">
+              <a:buNone/>
+            </a:pPr>
+            <a:endParaRPr lang="en-GB" dirty="0"/>
+          </a:p>
+          <a:p>
+            <a:pPr marL="0" indent="0">
+              <a:buNone/>
+            </a:pPr>
+            <a:r>
+              <a:rPr lang="en-GB" dirty="0"/>
+              <a:t>(5-2) + (5-2) + (5-1) + (5-3) + (5-2) = 15</a:t>
+            </a:r>
+          </a:p>
+          <a:p>
+            <a:pPr marL="0" indent="0">
+              <a:buNone/>
+            </a:pPr>
+            <a:endParaRPr lang="en-GB" dirty="0"/>
+          </a:p>
+          <a:p>
+            <a:r>
+              <a:rPr lang="en-GB" dirty="0"/>
+              <a:t>You then multiply the sum of the scores by 2.5 to obtain the overall value of SUS:</a:t>
+            </a:r>
+          </a:p>
+          <a:p>
+            <a:pPr marL="0" indent="0">
+              <a:buNone/>
+            </a:pPr>
+            <a:endParaRPr lang="en-GB" dirty="0"/>
+          </a:p>
+          <a:p>
+            <a:pPr marL="0" indent="0">
+              <a:buNone/>
+            </a:pPr>
+            <a:r>
+              <a:rPr lang="en-GB" dirty="0"/>
+              <a:t>(16 + 15) x 2.5 = </a:t>
             </a:r>
             <a:r>
               <a:rPr lang="en-GB" b="1" dirty="0"/>
-              <a:t>two factors </a:t>
-            </a:r>
-            <a:r>
-              <a:rPr lang="en-GB" dirty="0"/>
-              <a:t>can be identified in the SUS questionnaire:</a:t>
-            </a:r>
-          </a:p>
-          <a:p>
-            <a:pPr lvl="1"/>
-            <a:r>
-              <a:rPr lang="en-GB" dirty="0"/>
-              <a:t>Items 1, 2, 3, 5, 6, 7, 8, and 9 quantify the “</a:t>
-            </a:r>
-            <a:r>
-              <a:rPr lang="en-GB" b="1" dirty="0"/>
-              <a:t>Usable</a:t>
-            </a:r>
-            <a:r>
-              <a:rPr lang="en-GB" dirty="0"/>
-              <a:t>” factor</a:t>
-            </a:r>
-          </a:p>
-          <a:p>
-            <a:pPr lvl="1"/>
-            <a:r>
-              <a:rPr lang="en-GB" dirty="0"/>
-              <a:t>Items 4 and 10 quantify the “</a:t>
-            </a:r>
-            <a:r>
-              <a:rPr lang="en-GB" b="1" dirty="0"/>
-              <a:t>Learnable</a:t>
-            </a:r>
-            <a:r>
-              <a:rPr lang="en-GB" dirty="0"/>
-              <a:t>” factor</a:t>
-            </a:r>
-          </a:p>
-          <a:p>
-            <a:endParaRPr lang="en-GB" dirty="0"/>
-          </a:p>
-          <a:p>
-            <a:r>
-              <a:rPr lang="en-GB" dirty="0"/>
-              <a:t>To make the Usable and Learnable scores comparable with the Overall SUS score so they also range from 0 to 100, just multiply their summed score contributions by 3.125 for Usable and 12.5 for Learnable. </a:t>
-            </a:r>
-          </a:p>
-          <a:p>
-            <a:endParaRPr lang="en-GB" dirty="0"/>
-          </a:p>
-          <a:p>
-            <a:r>
-              <a:rPr lang="en-GB" dirty="0"/>
-              <a:t>The two subscale reliabilities were 0.91 for Usable and 0.70 for Learnable. </a:t>
-            </a:r>
+              <a:t>77.5</a:t>
+            </a:r>
+          </a:p>
+        </p:txBody>
+      </p:sp>
+      <p:pic>
+        <p:nvPicPr>
+          <p:cNvPr id="5" name="Picture 4" descr="A white and black checklist with black text&#10;&#10;Description automatically generated">
+            <a:extLst>
+              <a:ext uri="{FF2B5EF4-FFF2-40B4-BE49-F238E27FC236}">
+                <a16:creationId xmlns:a16="http://schemas.microsoft.com/office/drawing/2014/main" id="{9B602512-DEAB-C494-6D88-3EB020C55DBC}"/>
+              </a:ext>
+            </a:extLst>
+          </p:cNvPr>
+          <p:cNvPicPr>
+            <a:picLocks noChangeAspect="1"/>
+          </p:cNvPicPr>
+          <p:nvPr/>
+        </p:nvPicPr>
+        <p:blipFill>
+          <a:blip r:embed="rId2">
+            <a:extLst>
+              <a:ext uri="{28A0092B-C50C-407E-A947-70E740481C1C}">
+                <a14:useLocalDpi xmlns:a14="http://schemas.microsoft.com/office/drawing/2010/main" val="0"/>
+              </a:ext>
+            </a:extLst>
+          </a:blip>
+          <a:stretch>
+            <a:fillRect/>
+          </a:stretch>
+        </p:blipFill>
+        <p:spPr>
+          <a:xfrm>
+            <a:off x="5432302" y="1356302"/>
+            <a:ext cx="6605979" cy="4182053"/>
+          </a:xfrm>
+          <a:prstGeom prst="rect">
+            <a:avLst/>
+          </a:prstGeom>
+        </p:spPr>
+      </p:pic>
+      <p:sp>
+        <p:nvSpPr>
+          <p:cNvPr id="6" name="5-Point Star 5">
+            <a:extLst>
+              <a:ext uri="{FF2B5EF4-FFF2-40B4-BE49-F238E27FC236}">
+                <a16:creationId xmlns:a16="http://schemas.microsoft.com/office/drawing/2014/main" id="{E6CAD797-D726-B672-3D50-300854E773BF}"/>
+              </a:ext>
+            </a:extLst>
+          </p:cNvPr>
+          <p:cNvSpPr/>
+          <p:nvPr/>
+        </p:nvSpPr>
+        <p:spPr>
+          <a:xfrm>
+            <a:off x="11222183" y="2078183"/>
+            <a:ext cx="207819" cy="207818"/>
+          </a:xfrm>
+          <a:prstGeom prst="star5">
+            <a:avLst/>
+          </a:prstGeom>
+        </p:spPr>
+        <p:style>
+          <a:lnRef idx="2">
+            <a:schemeClr val="accent4">
+              <a:shade val="15000"/>
+            </a:schemeClr>
+          </a:lnRef>
+          <a:fillRef idx="1">
+            <a:schemeClr val="accent4"/>
+          </a:fillRef>
+          <a:effectRef idx="0">
+            <a:schemeClr val="accent4"/>
+          </a:effectRef>
+          <a:fontRef idx="minor">
+            <a:schemeClr val="lt1"/>
+          </a:fontRef>
+        </p:style>
+        <p:txBody>
+          <a:bodyPr rtlCol="0" anchor="ctr"/>
+          <a:lstStyle/>
+          <a:p>
+            <a:pPr algn="ctr"/>
+            <a:endParaRPr lang="en-US"/>
+          </a:p>
+        </p:txBody>
+      </p:sp>
+      <p:sp>
+        <p:nvSpPr>
+          <p:cNvPr id="7" name="5-Point Star 6">
+            <a:extLst>
+              <a:ext uri="{FF2B5EF4-FFF2-40B4-BE49-F238E27FC236}">
+                <a16:creationId xmlns:a16="http://schemas.microsoft.com/office/drawing/2014/main" id="{C43248EF-4609-7326-4BBF-B382001FD5F4}"/>
+              </a:ext>
+            </a:extLst>
+          </p:cNvPr>
+          <p:cNvSpPr/>
+          <p:nvPr/>
+        </p:nvSpPr>
+        <p:spPr>
+          <a:xfrm>
+            <a:off x="10983192" y="2306783"/>
+            <a:ext cx="207819" cy="207818"/>
+          </a:xfrm>
+          <a:prstGeom prst="star5">
+            <a:avLst/>
+          </a:prstGeom>
+        </p:spPr>
+        <p:style>
+          <a:lnRef idx="2">
+            <a:schemeClr val="accent4">
+              <a:shade val="15000"/>
+            </a:schemeClr>
+          </a:lnRef>
+          <a:fillRef idx="1">
+            <a:schemeClr val="accent4"/>
+          </a:fillRef>
+          <a:effectRef idx="0">
+            <a:schemeClr val="accent4"/>
+          </a:effectRef>
+          <a:fontRef idx="minor">
+            <a:schemeClr val="lt1"/>
+          </a:fontRef>
+        </p:style>
+        <p:txBody>
+          <a:bodyPr rtlCol="0" anchor="ctr"/>
+          <a:lstStyle/>
+          <a:p>
+            <a:pPr algn="ctr"/>
+            <a:endParaRPr lang="en-US"/>
+          </a:p>
+        </p:txBody>
+      </p:sp>
+      <p:sp>
+        <p:nvSpPr>
+          <p:cNvPr id="8" name="5-Point Star 7">
+            <a:extLst>
+              <a:ext uri="{FF2B5EF4-FFF2-40B4-BE49-F238E27FC236}">
+                <a16:creationId xmlns:a16="http://schemas.microsoft.com/office/drawing/2014/main" id="{ED8424BB-37DA-7D02-D9A6-08D5F56BFAD1}"/>
+              </a:ext>
+            </a:extLst>
+          </p:cNvPr>
+          <p:cNvSpPr/>
+          <p:nvPr/>
+        </p:nvSpPr>
+        <p:spPr>
+          <a:xfrm>
+            <a:off x="10983191" y="2848734"/>
+            <a:ext cx="207819" cy="207818"/>
+          </a:xfrm>
+          <a:prstGeom prst="star5">
+            <a:avLst/>
+          </a:prstGeom>
+        </p:spPr>
+        <p:style>
+          <a:lnRef idx="2">
+            <a:schemeClr val="accent4">
+              <a:shade val="15000"/>
+            </a:schemeClr>
+          </a:lnRef>
+          <a:fillRef idx="1">
+            <a:schemeClr val="accent4"/>
+          </a:fillRef>
+          <a:effectRef idx="0">
+            <a:schemeClr val="accent4"/>
+          </a:effectRef>
+          <a:fontRef idx="minor">
+            <a:schemeClr val="lt1"/>
+          </a:fontRef>
+        </p:style>
+        <p:txBody>
+          <a:bodyPr rtlCol="0" anchor="ctr"/>
+          <a:lstStyle/>
+          <a:p>
+            <a:pPr algn="ctr"/>
+            <a:endParaRPr lang="en-US"/>
+          </a:p>
+        </p:txBody>
+      </p:sp>
+      <p:sp>
+        <p:nvSpPr>
+          <p:cNvPr id="9" name="5-Point Star 8">
+            <a:extLst>
+              <a:ext uri="{FF2B5EF4-FFF2-40B4-BE49-F238E27FC236}">
+                <a16:creationId xmlns:a16="http://schemas.microsoft.com/office/drawing/2014/main" id="{80E8AA0B-CCFB-F8C7-C3CA-4125E1825F2D}"/>
+              </a:ext>
+            </a:extLst>
+          </p:cNvPr>
+          <p:cNvSpPr/>
+          <p:nvPr/>
+        </p:nvSpPr>
+        <p:spPr>
+          <a:xfrm>
+            <a:off x="11440393" y="2520769"/>
+            <a:ext cx="207819" cy="207818"/>
+          </a:xfrm>
+          <a:prstGeom prst="star5">
+            <a:avLst/>
+          </a:prstGeom>
+        </p:spPr>
+        <p:style>
+          <a:lnRef idx="2">
+            <a:schemeClr val="accent4">
+              <a:shade val="15000"/>
+            </a:schemeClr>
+          </a:lnRef>
+          <a:fillRef idx="1">
+            <a:schemeClr val="accent4"/>
+          </a:fillRef>
+          <a:effectRef idx="0">
+            <a:schemeClr val="accent4"/>
+          </a:effectRef>
+          <a:fontRef idx="minor">
+            <a:schemeClr val="lt1"/>
+          </a:fontRef>
+        </p:style>
+        <p:txBody>
+          <a:bodyPr rtlCol="0" anchor="ctr"/>
+          <a:lstStyle/>
+          <a:p>
+            <a:pPr algn="ctr"/>
+            <a:endParaRPr lang="en-US"/>
+          </a:p>
+        </p:txBody>
+      </p:sp>
+      <p:sp>
+        <p:nvSpPr>
+          <p:cNvPr id="10" name="5-Point Star 9">
+            <a:extLst>
+              <a:ext uri="{FF2B5EF4-FFF2-40B4-BE49-F238E27FC236}">
+                <a16:creationId xmlns:a16="http://schemas.microsoft.com/office/drawing/2014/main" id="{3F79B08E-E611-CBFE-3F4C-E21AD0B4B6A5}"/>
+              </a:ext>
+            </a:extLst>
+          </p:cNvPr>
+          <p:cNvSpPr/>
+          <p:nvPr/>
+        </p:nvSpPr>
+        <p:spPr>
+          <a:xfrm>
+            <a:off x="11440393" y="3313760"/>
+            <a:ext cx="207819" cy="207818"/>
+          </a:xfrm>
+          <a:prstGeom prst="star5">
+            <a:avLst/>
+          </a:prstGeom>
+        </p:spPr>
+        <p:style>
+          <a:lnRef idx="2">
+            <a:schemeClr val="accent4">
+              <a:shade val="15000"/>
+            </a:schemeClr>
+          </a:lnRef>
+          <a:fillRef idx="1">
+            <a:schemeClr val="accent4"/>
+          </a:fillRef>
+          <a:effectRef idx="0">
+            <a:schemeClr val="accent4"/>
+          </a:effectRef>
+          <a:fontRef idx="minor">
+            <a:schemeClr val="lt1"/>
+          </a:fontRef>
+        </p:style>
+        <p:txBody>
+          <a:bodyPr rtlCol="0" anchor="ctr"/>
+          <a:lstStyle/>
+          <a:p>
+            <a:pPr algn="ctr"/>
+            <a:endParaRPr lang="en-US"/>
+          </a:p>
+        </p:txBody>
+      </p:sp>
+      <p:sp>
+        <p:nvSpPr>
+          <p:cNvPr id="11" name="5-Point Star 10">
+            <a:extLst>
+              <a:ext uri="{FF2B5EF4-FFF2-40B4-BE49-F238E27FC236}">
+                <a16:creationId xmlns:a16="http://schemas.microsoft.com/office/drawing/2014/main" id="{C547899A-47FA-3BEC-6567-8AA9C93A262A}"/>
+              </a:ext>
+            </a:extLst>
+          </p:cNvPr>
+          <p:cNvSpPr/>
+          <p:nvPr/>
+        </p:nvSpPr>
+        <p:spPr>
+          <a:xfrm>
+            <a:off x="10744201" y="3773558"/>
+            <a:ext cx="207819" cy="207818"/>
+          </a:xfrm>
+          <a:prstGeom prst="star5">
+            <a:avLst/>
+          </a:prstGeom>
+        </p:spPr>
+        <p:style>
+          <a:lnRef idx="2">
+            <a:schemeClr val="accent4">
+              <a:shade val="15000"/>
+            </a:schemeClr>
+          </a:lnRef>
+          <a:fillRef idx="1">
+            <a:schemeClr val="accent4"/>
+          </a:fillRef>
+          <a:effectRef idx="0">
+            <a:schemeClr val="accent4"/>
+          </a:effectRef>
+          <a:fontRef idx="minor">
+            <a:schemeClr val="lt1"/>
+          </a:fontRef>
+        </p:style>
+        <p:txBody>
+          <a:bodyPr rtlCol="0" anchor="ctr"/>
+          <a:lstStyle/>
+          <a:p>
+            <a:pPr algn="ctr"/>
+            <a:endParaRPr lang="en-US"/>
+          </a:p>
+        </p:txBody>
+      </p:sp>
+      <p:sp>
+        <p:nvSpPr>
+          <p:cNvPr id="12" name="5-Point Star 11">
+            <a:extLst>
+              <a:ext uri="{FF2B5EF4-FFF2-40B4-BE49-F238E27FC236}">
+                <a16:creationId xmlns:a16="http://schemas.microsoft.com/office/drawing/2014/main" id="{CF470B5D-AD47-F429-62C9-1BB513588D6B}"/>
+              </a:ext>
+            </a:extLst>
+          </p:cNvPr>
+          <p:cNvSpPr/>
+          <p:nvPr/>
+        </p:nvSpPr>
+        <p:spPr>
+          <a:xfrm>
+            <a:off x="11242964" y="4572000"/>
+            <a:ext cx="207819" cy="207818"/>
+          </a:xfrm>
+          <a:prstGeom prst="star5">
+            <a:avLst/>
+          </a:prstGeom>
+        </p:spPr>
+        <p:style>
+          <a:lnRef idx="2">
+            <a:schemeClr val="accent4">
+              <a:shade val="15000"/>
+            </a:schemeClr>
+          </a:lnRef>
+          <a:fillRef idx="1">
+            <a:schemeClr val="accent4"/>
+          </a:fillRef>
+          <a:effectRef idx="0">
+            <a:schemeClr val="accent4"/>
+          </a:effectRef>
+          <a:fontRef idx="minor">
+            <a:schemeClr val="lt1"/>
+          </a:fontRef>
+        </p:style>
+        <p:txBody>
+          <a:bodyPr rtlCol="0" anchor="ctr"/>
+          <a:lstStyle/>
+          <a:p>
+            <a:pPr algn="ctr"/>
+            <a:endParaRPr lang="en-US"/>
+          </a:p>
+        </p:txBody>
+      </p:sp>
+      <p:sp>
+        <p:nvSpPr>
+          <p:cNvPr id="13" name="5-Point Star 12">
+            <a:extLst>
+              <a:ext uri="{FF2B5EF4-FFF2-40B4-BE49-F238E27FC236}">
+                <a16:creationId xmlns:a16="http://schemas.microsoft.com/office/drawing/2014/main" id="{9D33071E-FCAE-C61F-17D5-B2C5378F4DAE}"/>
+              </a:ext>
+            </a:extLst>
+          </p:cNvPr>
+          <p:cNvSpPr/>
+          <p:nvPr/>
+        </p:nvSpPr>
+        <p:spPr>
+          <a:xfrm>
+            <a:off x="11656457" y="4779818"/>
+            <a:ext cx="207819" cy="207818"/>
+          </a:xfrm>
+          <a:prstGeom prst="star5">
+            <a:avLst/>
+          </a:prstGeom>
+        </p:spPr>
+        <p:style>
+          <a:lnRef idx="2">
+            <a:schemeClr val="accent4">
+              <a:shade val="15000"/>
+            </a:schemeClr>
+          </a:lnRef>
+          <a:fillRef idx="1">
+            <a:schemeClr val="accent4"/>
+          </a:fillRef>
+          <a:effectRef idx="0">
+            <a:schemeClr val="accent4"/>
+          </a:effectRef>
+          <a:fontRef idx="minor">
+            <a:schemeClr val="lt1"/>
+          </a:fontRef>
+        </p:style>
+        <p:txBody>
+          <a:bodyPr rtlCol="0" anchor="ctr"/>
+          <a:lstStyle/>
+          <a:p>
+            <a:pPr algn="ctr"/>
+            <a:endParaRPr lang="en-US"/>
+          </a:p>
+        </p:txBody>
+      </p:sp>
+      <p:sp>
+        <p:nvSpPr>
+          <p:cNvPr id="14" name="5-Point Star 13">
+            <a:extLst>
+              <a:ext uri="{FF2B5EF4-FFF2-40B4-BE49-F238E27FC236}">
+                <a16:creationId xmlns:a16="http://schemas.microsoft.com/office/drawing/2014/main" id="{3F1405DB-CB4B-0F5C-32A5-A8BB516CBBCE}"/>
+              </a:ext>
+            </a:extLst>
+          </p:cNvPr>
+          <p:cNvSpPr/>
+          <p:nvPr/>
+        </p:nvSpPr>
+        <p:spPr>
+          <a:xfrm>
+            <a:off x="11222182" y="4237867"/>
+            <a:ext cx="207819" cy="207818"/>
+          </a:xfrm>
+          <a:prstGeom prst="star5">
+            <a:avLst/>
+          </a:prstGeom>
+        </p:spPr>
+        <p:style>
+          <a:lnRef idx="2">
+            <a:schemeClr val="accent4">
+              <a:shade val="15000"/>
+            </a:schemeClr>
+          </a:lnRef>
+          <a:fillRef idx="1">
+            <a:schemeClr val="accent4"/>
+          </a:fillRef>
+          <a:effectRef idx="0">
+            <a:schemeClr val="accent4"/>
+          </a:effectRef>
+          <a:fontRef idx="minor">
+            <a:schemeClr val="lt1"/>
+          </a:fontRef>
+        </p:style>
+        <p:txBody>
+          <a:bodyPr rtlCol="0" anchor="ctr"/>
+          <a:lstStyle/>
+          <a:p>
+            <a:pPr algn="ctr"/>
+            <a:endParaRPr lang="en-US"/>
+          </a:p>
+        </p:txBody>
+      </p:sp>
+      <p:sp>
+        <p:nvSpPr>
+          <p:cNvPr id="15" name="5-Point Star 14">
+            <a:extLst>
+              <a:ext uri="{FF2B5EF4-FFF2-40B4-BE49-F238E27FC236}">
+                <a16:creationId xmlns:a16="http://schemas.microsoft.com/office/drawing/2014/main" id="{8AD6248E-338C-B86A-3ACD-D64139EBE639}"/>
+              </a:ext>
+            </a:extLst>
+          </p:cNvPr>
+          <p:cNvSpPr/>
+          <p:nvPr/>
+        </p:nvSpPr>
+        <p:spPr>
+          <a:xfrm>
+            <a:off x="10992509" y="5117630"/>
+            <a:ext cx="207819" cy="207818"/>
+          </a:xfrm>
+          <a:prstGeom prst="star5">
+            <a:avLst/>
+          </a:prstGeom>
+        </p:spPr>
+        <p:style>
+          <a:lnRef idx="2">
+            <a:schemeClr val="accent4">
+              <a:shade val="15000"/>
+            </a:schemeClr>
+          </a:lnRef>
+          <a:fillRef idx="1">
+            <a:schemeClr val="accent4"/>
+          </a:fillRef>
+          <a:effectRef idx="0">
+            <a:schemeClr val="accent4"/>
+          </a:effectRef>
+          <a:fontRef idx="minor">
+            <a:schemeClr val="lt1"/>
+          </a:fontRef>
+        </p:style>
+        <p:txBody>
+          <a:bodyPr rtlCol="0" anchor="ctr"/>
+          <a:lstStyle/>
+          <a:p>
+            <a:pPr algn="ctr"/>
+            <a:endParaRPr lang="en-US"/>
           </a:p>
         </p:txBody>
       </p:sp>
     </p:spTree>
     <p:extLst>
       <p:ext uri="{BB962C8B-B14F-4D97-AF65-F5344CB8AC3E}">
-        <p14:creationId xmlns:p14="http://schemas.microsoft.com/office/powerpoint/2010/main" val="2738536663"/>
+        <p14:creationId xmlns:p14="http://schemas.microsoft.com/office/powerpoint/2010/main" val="2653211012"/>
       </p:ext>
     </p:extLst>
   </p:cSld>
@@ -4203,14 +4676,12 @@
         </p:nvSpPr>
         <p:spPr/>
         <p:txBody>
-          <a:bodyPr>
-            <a:normAutofit fontScale="90000"/>
-          </a:bodyPr>
+          <a:bodyPr/>
           <a:lstStyle/>
           <a:p>
             <a:r>
               <a:rPr lang="it-IT" dirty="0" err="1"/>
-              <a:t>Where</a:t>
+              <a:t>Psychometric</a:t>
             </a:r>
             <a:r>
               <a:rPr lang="it-IT" dirty="0"/>
@@ -4218,19 +4689,11 @@
             </a:r>
             <a:r>
               <a:rPr lang="it-IT" dirty="0" err="1"/>
-              <a:t>did</a:t>
+              <a:t>evaluation</a:t>
             </a:r>
             <a:r>
               <a:rPr lang="it-IT" dirty="0"/>
-              <a:t> the 2.5, 3.125 and 12.5 </a:t>
-            </a:r>
-            <a:r>
-              <a:rPr lang="it-IT" dirty="0" err="1"/>
-              <a:t>multipliers</a:t>
-            </a:r>
-            <a:r>
-              <a:rPr lang="it-IT" dirty="0"/>
-              <a:t> come from? </a:t>
+              <a:t> of SUS</a:t>
             </a:r>
             <a:endParaRPr lang="en-GB" dirty="0"/>
           </a:p>
@@ -4295,58 +4758,63 @@
           <a:p>
             <a:r>
               <a:rPr lang="en-GB" dirty="0"/>
-              <a:t>The standard SUS raw score contributions can range from 0 to 40 (ten items with five scale steps ranging from 0 to 4). To get the multiplier needed to increase the apparent range of the summed scale to 100, divide 100 by the maximum sum of 40, which equals 2.5:</a:t>
-            </a:r>
-          </a:p>
-          <a:p>
-            <a:pPr marL="0" indent="0">
-              <a:buNone/>
-            </a:pPr>
-            <a:r>
-              <a:rPr lang="en-GB" dirty="0"/>
-              <a:t>	100/40 = 2.5</a:t>
-            </a:r>
-          </a:p>
-          <a:p>
-            <a:pPr marL="0" indent="0">
-              <a:buNone/>
-            </a:pPr>
+              <a:t>According to an investigation of the psychometric properties of the SUS (from 2324 SUS questionnaires), </a:t>
+            </a:r>
+            <a:r>
+              <a:rPr lang="en-GB" b="1" dirty="0"/>
+              <a:t>two factors </a:t>
+            </a:r>
+            <a:r>
+              <a:rPr lang="en-GB" dirty="0"/>
+              <a:t>can be identified in the SUS questionnaire:</a:t>
+            </a:r>
+          </a:p>
+          <a:p>
+            <a:pPr lvl="1"/>
+            <a:r>
+              <a:rPr lang="en-GB" dirty="0"/>
+              <a:t>Items 1, 2, 3, 5, 6, 7, 8, and 9 quantify the “</a:t>
+            </a:r>
+            <a:r>
+              <a:rPr lang="en-GB" b="1" dirty="0"/>
+              <a:t>Usable</a:t>
+            </a:r>
+            <a:r>
+              <a:rPr lang="en-GB" dirty="0"/>
+              <a:t>” factor</a:t>
+            </a:r>
+          </a:p>
+          <a:p>
+            <a:pPr lvl="1"/>
+            <a:r>
+              <a:rPr lang="en-GB" dirty="0"/>
+              <a:t>Items 4 and 10 quantify the “</a:t>
+            </a:r>
+            <a:r>
+              <a:rPr lang="en-GB" b="1" dirty="0"/>
+              <a:t>Learnable</a:t>
+            </a:r>
+            <a:r>
+              <a:rPr lang="en-GB" dirty="0"/>
+              <a:t>” factor</a:t>
+            </a:r>
+          </a:p>
+          <a:p>
             <a:endParaRPr lang="en-GB" dirty="0"/>
           </a:p>
           <a:p>
             <a:r>
               <a:rPr lang="en-GB" dirty="0"/>
-              <a:t>Because the Usable subscale has eight items, its range for summed score contributions is 0-32, so its multiplier is:</a:t>
-            </a:r>
-          </a:p>
-          <a:p>
-            <a:pPr marL="0" indent="0">
-              <a:buNone/>
-            </a:pPr>
-            <a:r>
-              <a:rPr lang="en-GB" dirty="0"/>
-              <a:t>	100/32 = 3.125</a:t>
-            </a:r>
-          </a:p>
-          <a:p>
-            <a:pPr marL="0" indent="0">
-              <a:buNone/>
-            </a:pPr>
+              <a:t>To make the Usable and Learnable scores comparable with the Overall SUS score so they also range from 0 to 100, just multiply their summed score contributions by 3.125 for Usable and 12.5 for Learnable. </a:t>
+            </a:r>
+          </a:p>
+          <a:p>
             <a:endParaRPr lang="en-GB" dirty="0"/>
           </a:p>
           <a:p>
             <a:r>
               <a:rPr lang="en-GB" dirty="0"/>
-              <a:t>Following the same process, the multiplier for the Learnable subscale is:</a:t>
-            </a:r>
-          </a:p>
-          <a:p>
-            <a:pPr marL="0" indent="0">
-              <a:buNone/>
-            </a:pPr>
-            <a:r>
-              <a:rPr lang="en-GB" dirty="0"/>
-              <a:t>	100/8 = 12.5</a:t>
+              <a:t>The two subscale reliabilities were 0.91 for Usable and 0.70 for Learnable. </a:t>
             </a:r>
           </a:p>
         </p:txBody>
@@ -4354,7 +4822,7 @@
     </p:spTree>
     <p:extLst>
       <p:ext uri="{BB962C8B-B14F-4D97-AF65-F5344CB8AC3E}">
-        <p14:creationId xmlns:p14="http://schemas.microsoft.com/office/powerpoint/2010/main" val="2379956208"/>
+        <p14:creationId xmlns:p14="http://schemas.microsoft.com/office/powerpoint/2010/main" val="2738536663"/>
       </p:ext>
     </p:extLst>
   </p:cSld>
@@ -4405,16 +4873,34 @@
         </p:nvSpPr>
         <p:spPr/>
         <p:txBody>
-          <a:bodyPr/>
+          <a:bodyPr>
+            <a:normAutofit fontScale="90000"/>
+          </a:bodyPr>
           <a:lstStyle/>
           <a:p>
             <a:r>
               <a:rPr lang="it-IT" dirty="0" err="1"/>
-              <a:t>Example</a:t>
+              <a:t>Where</a:t>
             </a:r>
             <a:r>
               <a:rPr lang="it-IT" dirty="0"/>
-              <a:t> – Overall SUS</a:t>
+              <a:t> </a:t>
+            </a:r>
+            <a:r>
+              <a:rPr lang="it-IT" dirty="0" err="1"/>
+              <a:t>did</a:t>
+            </a:r>
+            <a:r>
+              <a:rPr lang="it-IT" dirty="0"/>
+              <a:t> the 2.5, 3.125 and 12.5 </a:t>
+            </a:r>
+            <a:r>
+              <a:rPr lang="it-IT" dirty="0" err="1"/>
+              <a:t>multipliers</a:t>
+            </a:r>
+            <a:r>
+              <a:rPr lang="it-IT" dirty="0"/>
+              <a:t> come from? </a:t>
             </a:r>
             <a:endParaRPr lang="en-GB" dirty="0"/>
           </a:p>
@@ -4467,23 +4953,20 @@
         </p:nvSpPr>
         <p:spPr>
           <a:xfrm>
-            <a:off x="297383" y="1243107"/>
-            <a:ext cx="5059876" cy="5295805"/>
+            <a:off x="551214" y="1240077"/>
+            <a:ext cx="10920349" cy="5481398"/>
           </a:xfrm>
         </p:spPr>
         <p:txBody>
           <a:bodyPr>
-            <a:normAutofit fontScale="85000" lnSpcReduction="20000"/>
+            <a:normAutofit/>
           </a:bodyPr>
           <a:lstStyle/>
           <a:p>
             <a:r>
               <a:rPr lang="en-GB" dirty="0"/>
-              <a:t>For items 1, 3, 5, 7, and 9 (the positively worded items) the score contribution is the scale position minus 1:</a:t>
-            </a:r>
-          </a:p>
-          <a:p>
-            <a:endParaRPr lang="en-GB" dirty="0"/>
+              <a:t>The standard SUS raw score contributions can range from 0 to 40 (ten items with five scale steps ranging from 0 to 4). To get the multiplier needed to increase the apparent range of the summed scale to 100, divide 100 by the maximum sum of 40, which equals 2.5:</a:t>
+            </a:r>
           </a:p>
           <a:p>
             <a:pPr marL="0" indent="0">
@@ -4491,16 +4974,7 @@
             </a:pPr>
             <a:r>
               <a:rPr lang="en-GB" dirty="0"/>
-              <a:t>(3-1) + (4-1) + (4-1) + (3-1) + (5-1) = 16</a:t>
-            </a:r>
-          </a:p>
-          <a:p>
-            <a:endParaRPr lang="en-GB" dirty="0"/>
-          </a:p>
-          <a:p>
-            <a:r>
-              <a:rPr lang="en-GB" dirty="0"/>
-              <a:t>For items 2, 4, 6, 8, and 10 (the negatively worded items), the contribution is 5 minus the scale position:</a:t>
+              <a:t>	100/40 = 2.5</a:t>
             </a:r>
           </a:p>
           <a:p>
@@ -4510,12 +4984,18 @@
             <a:endParaRPr lang="en-GB" dirty="0"/>
           </a:p>
           <a:p>
+            <a:r>
+              <a:rPr lang="en-GB" dirty="0"/>
+              <a:t>Because the Usable subscale has eight items, its range for summed score contributions is 0-32, so its multiplier is:</a:t>
+            </a:r>
+          </a:p>
+          <a:p>
             <a:pPr marL="0" indent="0">
               <a:buNone/>
             </a:pPr>
             <a:r>
               <a:rPr lang="en-GB" dirty="0"/>
-              <a:t>(5-2) + (5-2) + (5-1) + (5-3) + (5-2) = 15</a:t>
+              <a:t>	100/32 = 3.125</a:t>
             </a:r>
           </a:p>
           <a:p>
@@ -4527,530 +5007,24 @@
           <a:p>
             <a:r>
               <a:rPr lang="en-GB" dirty="0"/>
-              <a:t>You then multiply the sum of the scores by 2.5 to obtain the overall value of SUS:</a:t>
+              <a:t>Following the same process, the multiplier for the Learnable subscale is:</a:t>
             </a:r>
           </a:p>
           <a:p>
             <a:pPr marL="0" indent="0">
               <a:buNone/>
             </a:pPr>
-            <a:endParaRPr lang="en-GB" dirty="0"/>
-          </a:p>
-          <a:p>
-            <a:pPr marL="0" indent="0">
-              <a:buNone/>
-            </a:pPr>
-            <a:r>
-              <a:rPr lang="en-GB" dirty="0"/>
-              <a:t>(16 + 15) x 2.5 = </a:t>
-            </a:r>
-            <a:r>
-              <a:rPr lang="en-GB" b="1" dirty="0"/>
-              <a:t>77.5</a:t>
-            </a:r>
-          </a:p>
-        </p:txBody>
-      </p:sp>
-      <p:pic>
-        <p:nvPicPr>
-          <p:cNvPr id="5" name="Picture 4" descr="A white and black checklist with black text&#10;&#10;Description automatically generated">
-            <a:extLst>
-              <a:ext uri="{FF2B5EF4-FFF2-40B4-BE49-F238E27FC236}">
-                <a16:creationId xmlns:a16="http://schemas.microsoft.com/office/drawing/2014/main" id="{9B602512-DEAB-C494-6D88-3EB020C55DBC}"/>
-              </a:ext>
-            </a:extLst>
-          </p:cNvPr>
-          <p:cNvPicPr>
-            <a:picLocks noChangeAspect="1"/>
-          </p:cNvPicPr>
-          <p:nvPr/>
-        </p:nvPicPr>
-        <p:blipFill>
-          <a:blip r:embed="rId2">
-            <a:extLst>
-              <a:ext uri="{28A0092B-C50C-407E-A947-70E740481C1C}">
-                <a14:useLocalDpi xmlns:a14="http://schemas.microsoft.com/office/drawing/2010/main" val="0"/>
-              </a:ext>
-            </a:extLst>
-          </a:blip>
-          <a:stretch>
-            <a:fillRect/>
-          </a:stretch>
-        </p:blipFill>
-        <p:spPr>
-          <a:xfrm>
-            <a:off x="5432302" y="1356302"/>
-            <a:ext cx="6605979" cy="4182053"/>
-          </a:xfrm>
-          <a:prstGeom prst="rect">
-            <a:avLst/>
-          </a:prstGeom>
-        </p:spPr>
-      </p:pic>
-      <p:sp>
-        <p:nvSpPr>
-          <p:cNvPr id="6" name="5-Point Star 5">
-            <a:extLst>
-              <a:ext uri="{FF2B5EF4-FFF2-40B4-BE49-F238E27FC236}">
-                <a16:creationId xmlns:a16="http://schemas.microsoft.com/office/drawing/2014/main" id="{E6CAD797-D726-B672-3D50-300854E773BF}"/>
-              </a:ext>
-            </a:extLst>
-          </p:cNvPr>
-          <p:cNvSpPr/>
-          <p:nvPr/>
-        </p:nvSpPr>
-        <p:spPr>
-          <a:xfrm>
-            <a:off x="11222183" y="2078183"/>
-            <a:ext cx="207819" cy="207818"/>
-          </a:xfrm>
-          <a:prstGeom prst="star5">
-            <a:avLst/>
-          </a:prstGeom>
-        </p:spPr>
-        <p:style>
-          <a:lnRef idx="2">
-            <a:schemeClr val="accent4">
-              <a:shade val="15000"/>
-            </a:schemeClr>
-          </a:lnRef>
-          <a:fillRef idx="1">
-            <a:schemeClr val="accent4"/>
-          </a:fillRef>
-          <a:effectRef idx="0">
-            <a:schemeClr val="accent4"/>
-          </a:effectRef>
-          <a:fontRef idx="minor">
-            <a:schemeClr val="lt1"/>
-          </a:fontRef>
-        </p:style>
-        <p:txBody>
-          <a:bodyPr rtlCol="0" anchor="ctr"/>
-          <a:lstStyle/>
-          <a:p>
-            <a:pPr algn="ctr"/>
-            <a:endParaRPr lang="en-US"/>
-          </a:p>
-        </p:txBody>
-      </p:sp>
-      <p:sp>
-        <p:nvSpPr>
-          <p:cNvPr id="7" name="5-Point Star 6">
-            <a:extLst>
-              <a:ext uri="{FF2B5EF4-FFF2-40B4-BE49-F238E27FC236}">
-                <a16:creationId xmlns:a16="http://schemas.microsoft.com/office/drawing/2014/main" id="{C43248EF-4609-7326-4BBF-B382001FD5F4}"/>
-              </a:ext>
-            </a:extLst>
-          </p:cNvPr>
-          <p:cNvSpPr/>
-          <p:nvPr/>
-        </p:nvSpPr>
-        <p:spPr>
-          <a:xfrm>
-            <a:off x="10983192" y="2306783"/>
-            <a:ext cx="207819" cy="207818"/>
-          </a:xfrm>
-          <a:prstGeom prst="star5">
-            <a:avLst/>
-          </a:prstGeom>
-        </p:spPr>
-        <p:style>
-          <a:lnRef idx="2">
-            <a:schemeClr val="accent4">
-              <a:shade val="15000"/>
-            </a:schemeClr>
-          </a:lnRef>
-          <a:fillRef idx="1">
-            <a:schemeClr val="accent4"/>
-          </a:fillRef>
-          <a:effectRef idx="0">
-            <a:schemeClr val="accent4"/>
-          </a:effectRef>
-          <a:fontRef idx="minor">
-            <a:schemeClr val="lt1"/>
-          </a:fontRef>
-        </p:style>
-        <p:txBody>
-          <a:bodyPr rtlCol="0" anchor="ctr"/>
-          <a:lstStyle/>
-          <a:p>
-            <a:pPr algn="ctr"/>
-            <a:endParaRPr lang="en-US"/>
-          </a:p>
-        </p:txBody>
-      </p:sp>
-      <p:sp>
-        <p:nvSpPr>
-          <p:cNvPr id="8" name="5-Point Star 7">
-            <a:extLst>
-              <a:ext uri="{FF2B5EF4-FFF2-40B4-BE49-F238E27FC236}">
-                <a16:creationId xmlns:a16="http://schemas.microsoft.com/office/drawing/2014/main" id="{ED8424BB-37DA-7D02-D9A6-08D5F56BFAD1}"/>
-              </a:ext>
-            </a:extLst>
-          </p:cNvPr>
-          <p:cNvSpPr/>
-          <p:nvPr/>
-        </p:nvSpPr>
-        <p:spPr>
-          <a:xfrm>
-            <a:off x="10983191" y="2848734"/>
-            <a:ext cx="207819" cy="207818"/>
-          </a:xfrm>
-          <a:prstGeom prst="star5">
-            <a:avLst/>
-          </a:prstGeom>
-        </p:spPr>
-        <p:style>
-          <a:lnRef idx="2">
-            <a:schemeClr val="accent4">
-              <a:shade val="15000"/>
-            </a:schemeClr>
-          </a:lnRef>
-          <a:fillRef idx="1">
-            <a:schemeClr val="accent4"/>
-          </a:fillRef>
-          <a:effectRef idx="0">
-            <a:schemeClr val="accent4"/>
-          </a:effectRef>
-          <a:fontRef idx="minor">
-            <a:schemeClr val="lt1"/>
-          </a:fontRef>
-        </p:style>
-        <p:txBody>
-          <a:bodyPr rtlCol="0" anchor="ctr"/>
-          <a:lstStyle/>
-          <a:p>
-            <a:pPr algn="ctr"/>
-            <a:endParaRPr lang="en-US"/>
-          </a:p>
-        </p:txBody>
-      </p:sp>
-      <p:sp>
-        <p:nvSpPr>
-          <p:cNvPr id="9" name="5-Point Star 8">
-            <a:extLst>
-              <a:ext uri="{FF2B5EF4-FFF2-40B4-BE49-F238E27FC236}">
-                <a16:creationId xmlns:a16="http://schemas.microsoft.com/office/drawing/2014/main" id="{80E8AA0B-CCFB-F8C7-C3CA-4125E1825F2D}"/>
-              </a:ext>
-            </a:extLst>
-          </p:cNvPr>
-          <p:cNvSpPr/>
-          <p:nvPr/>
-        </p:nvSpPr>
-        <p:spPr>
-          <a:xfrm>
-            <a:off x="11440393" y="2520769"/>
-            <a:ext cx="207819" cy="207818"/>
-          </a:xfrm>
-          <a:prstGeom prst="star5">
-            <a:avLst/>
-          </a:prstGeom>
-        </p:spPr>
-        <p:style>
-          <a:lnRef idx="2">
-            <a:schemeClr val="accent4">
-              <a:shade val="15000"/>
-            </a:schemeClr>
-          </a:lnRef>
-          <a:fillRef idx="1">
-            <a:schemeClr val="accent4"/>
-          </a:fillRef>
-          <a:effectRef idx="0">
-            <a:schemeClr val="accent4"/>
-          </a:effectRef>
-          <a:fontRef idx="minor">
-            <a:schemeClr val="lt1"/>
-          </a:fontRef>
-        </p:style>
-        <p:txBody>
-          <a:bodyPr rtlCol="0" anchor="ctr"/>
-          <a:lstStyle/>
-          <a:p>
-            <a:pPr algn="ctr"/>
-            <a:endParaRPr lang="en-US"/>
-          </a:p>
-        </p:txBody>
-      </p:sp>
-      <p:sp>
-        <p:nvSpPr>
-          <p:cNvPr id="10" name="5-Point Star 9">
-            <a:extLst>
-              <a:ext uri="{FF2B5EF4-FFF2-40B4-BE49-F238E27FC236}">
-                <a16:creationId xmlns:a16="http://schemas.microsoft.com/office/drawing/2014/main" id="{3F79B08E-E611-CBFE-3F4C-E21AD0B4B6A5}"/>
-              </a:ext>
-            </a:extLst>
-          </p:cNvPr>
-          <p:cNvSpPr/>
-          <p:nvPr/>
-        </p:nvSpPr>
-        <p:spPr>
-          <a:xfrm>
-            <a:off x="11440393" y="3313760"/>
-            <a:ext cx="207819" cy="207818"/>
-          </a:xfrm>
-          <a:prstGeom prst="star5">
-            <a:avLst/>
-          </a:prstGeom>
-        </p:spPr>
-        <p:style>
-          <a:lnRef idx="2">
-            <a:schemeClr val="accent4">
-              <a:shade val="15000"/>
-            </a:schemeClr>
-          </a:lnRef>
-          <a:fillRef idx="1">
-            <a:schemeClr val="accent4"/>
-          </a:fillRef>
-          <a:effectRef idx="0">
-            <a:schemeClr val="accent4"/>
-          </a:effectRef>
-          <a:fontRef idx="minor">
-            <a:schemeClr val="lt1"/>
-          </a:fontRef>
-        </p:style>
-        <p:txBody>
-          <a:bodyPr rtlCol="0" anchor="ctr"/>
-          <a:lstStyle/>
-          <a:p>
-            <a:pPr algn="ctr"/>
-            <a:endParaRPr lang="en-US"/>
-          </a:p>
-        </p:txBody>
-      </p:sp>
-      <p:sp>
-        <p:nvSpPr>
-          <p:cNvPr id="11" name="5-Point Star 10">
-            <a:extLst>
-              <a:ext uri="{FF2B5EF4-FFF2-40B4-BE49-F238E27FC236}">
-                <a16:creationId xmlns:a16="http://schemas.microsoft.com/office/drawing/2014/main" id="{C547899A-47FA-3BEC-6567-8AA9C93A262A}"/>
-              </a:ext>
-            </a:extLst>
-          </p:cNvPr>
-          <p:cNvSpPr/>
-          <p:nvPr/>
-        </p:nvSpPr>
-        <p:spPr>
-          <a:xfrm>
-            <a:off x="10744201" y="3773558"/>
-            <a:ext cx="207819" cy="207818"/>
-          </a:xfrm>
-          <a:prstGeom prst="star5">
-            <a:avLst/>
-          </a:prstGeom>
-        </p:spPr>
-        <p:style>
-          <a:lnRef idx="2">
-            <a:schemeClr val="accent4">
-              <a:shade val="15000"/>
-            </a:schemeClr>
-          </a:lnRef>
-          <a:fillRef idx="1">
-            <a:schemeClr val="accent4"/>
-          </a:fillRef>
-          <a:effectRef idx="0">
-            <a:schemeClr val="accent4"/>
-          </a:effectRef>
-          <a:fontRef idx="minor">
-            <a:schemeClr val="lt1"/>
-          </a:fontRef>
-        </p:style>
-        <p:txBody>
-          <a:bodyPr rtlCol="0" anchor="ctr"/>
-          <a:lstStyle/>
-          <a:p>
-            <a:pPr algn="ctr"/>
-            <a:endParaRPr lang="en-US"/>
-          </a:p>
-        </p:txBody>
-      </p:sp>
-      <p:sp>
-        <p:nvSpPr>
-          <p:cNvPr id="12" name="5-Point Star 11">
-            <a:extLst>
-              <a:ext uri="{FF2B5EF4-FFF2-40B4-BE49-F238E27FC236}">
-                <a16:creationId xmlns:a16="http://schemas.microsoft.com/office/drawing/2014/main" id="{CF470B5D-AD47-F429-62C9-1BB513588D6B}"/>
-              </a:ext>
-            </a:extLst>
-          </p:cNvPr>
-          <p:cNvSpPr/>
-          <p:nvPr/>
-        </p:nvSpPr>
-        <p:spPr>
-          <a:xfrm>
-            <a:off x="11242964" y="4572000"/>
-            <a:ext cx="207819" cy="207818"/>
-          </a:xfrm>
-          <a:prstGeom prst="star5">
-            <a:avLst/>
-          </a:prstGeom>
-        </p:spPr>
-        <p:style>
-          <a:lnRef idx="2">
-            <a:schemeClr val="accent4">
-              <a:shade val="15000"/>
-            </a:schemeClr>
-          </a:lnRef>
-          <a:fillRef idx="1">
-            <a:schemeClr val="accent4"/>
-          </a:fillRef>
-          <a:effectRef idx="0">
-            <a:schemeClr val="accent4"/>
-          </a:effectRef>
-          <a:fontRef idx="minor">
-            <a:schemeClr val="lt1"/>
-          </a:fontRef>
-        </p:style>
-        <p:txBody>
-          <a:bodyPr rtlCol="0" anchor="ctr"/>
-          <a:lstStyle/>
-          <a:p>
-            <a:pPr algn="ctr"/>
-            <a:endParaRPr lang="en-US"/>
-          </a:p>
-        </p:txBody>
-      </p:sp>
-      <p:sp>
-        <p:nvSpPr>
-          <p:cNvPr id="13" name="5-Point Star 12">
-            <a:extLst>
-              <a:ext uri="{FF2B5EF4-FFF2-40B4-BE49-F238E27FC236}">
-                <a16:creationId xmlns:a16="http://schemas.microsoft.com/office/drawing/2014/main" id="{9D33071E-FCAE-C61F-17D5-B2C5378F4DAE}"/>
-              </a:ext>
-            </a:extLst>
-          </p:cNvPr>
-          <p:cNvSpPr/>
-          <p:nvPr/>
-        </p:nvSpPr>
-        <p:spPr>
-          <a:xfrm>
-            <a:off x="11656457" y="4779818"/>
-            <a:ext cx="207819" cy="207818"/>
-          </a:xfrm>
-          <a:prstGeom prst="star5">
-            <a:avLst/>
-          </a:prstGeom>
-        </p:spPr>
-        <p:style>
-          <a:lnRef idx="2">
-            <a:schemeClr val="accent4">
-              <a:shade val="15000"/>
-            </a:schemeClr>
-          </a:lnRef>
-          <a:fillRef idx="1">
-            <a:schemeClr val="accent4"/>
-          </a:fillRef>
-          <a:effectRef idx="0">
-            <a:schemeClr val="accent4"/>
-          </a:effectRef>
-          <a:fontRef idx="minor">
-            <a:schemeClr val="lt1"/>
-          </a:fontRef>
-        </p:style>
-        <p:txBody>
-          <a:bodyPr rtlCol="0" anchor="ctr"/>
-          <a:lstStyle/>
-          <a:p>
-            <a:pPr algn="ctr"/>
-            <a:endParaRPr lang="en-US"/>
-          </a:p>
-        </p:txBody>
-      </p:sp>
-      <p:sp>
-        <p:nvSpPr>
-          <p:cNvPr id="14" name="5-Point Star 13">
-            <a:extLst>
-              <a:ext uri="{FF2B5EF4-FFF2-40B4-BE49-F238E27FC236}">
-                <a16:creationId xmlns:a16="http://schemas.microsoft.com/office/drawing/2014/main" id="{3F1405DB-CB4B-0F5C-32A5-A8BB516CBBCE}"/>
-              </a:ext>
-            </a:extLst>
-          </p:cNvPr>
-          <p:cNvSpPr/>
-          <p:nvPr/>
-        </p:nvSpPr>
-        <p:spPr>
-          <a:xfrm>
-            <a:off x="11222182" y="4237867"/>
-            <a:ext cx="207819" cy="207818"/>
-          </a:xfrm>
-          <a:prstGeom prst="star5">
-            <a:avLst/>
-          </a:prstGeom>
-        </p:spPr>
-        <p:style>
-          <a:lnRef idx="2">
-            <a:schemeClr val="accent4">
-              <a:shade val="15000"/>
-            </a:schemeClr>
-          </a:lnRef>
-          <a:fillRef idx="1">
-            <a:schemeClr val="accent4"/>
-          </a:fillRef>
-          <a:effectRef idx="0">
-            <a:schemeClr val="accent4"/>
-          </a:effectRef>
-          <a:fontRef idx="minor">
-            <a:schemeClr val="lt1"/>
-          </a:fontRef>
-        </p:style>
-        <p:txBody>
-          <a:bodyPr rtlCol="0" anchor="ctr"/>
-          <a:lstStyle/>
-          <a:p>
-            <a:pPr algn="ctr"/>
-            <a:endParaRPr lang="en-US"/>
-          </a:p>
-        </p:txBody>
-      </p:sp>
-      <p:sp>
-        <p:nvSpPr>
-          <p:cNvPr id="15" name="5-Point Star 14">
-            <a:extLst>
-              <a:ext uri="{FF2B5EF4-FFF2-40B4-BE49-F238E27FC236}">
-                <a16:creationId xmlns:a16="http://schemas.microsoft.com/office/drawing/2014/main" id="{8AD6248E-338C-B86A-3ACD-D64139EBE639}"/>
-              </a:ext>
-            </a:extLst>
-          </p:cNvPr>
-          <p:cNvSpPr/>
-          <p:nvPr/>
-        </p:nvSpPr>
-        <p:spPr>
-          <a:xfrm>
-            <a:off x="10992509" y="5117630"/>
-            <a:ext cx="207819" cy="207818"/>
-          </a:xfrm>
-          <a:prstGeom prst="star5">
-            <a:avLst/>
-          </a:prstGeom>
-        </p:spPr>
-        <p:style>
-          <a:lnRef idx="2">
-            <a:schemeClr val="accent4">
-              <a:shade val="15000"/>
-            </a:schemeClr>
-          </a:lnRef>
-          <a:fillRef idx="1">
-            <a:schemeClr val="accent4"/>
-          </a:fillRef>
-          <a:effectRef idx="0">
-            <a:schemeClr val="accent4"/>
-          </a:effectRef>
-          <a:fontRef idx="minor">
-            <a:schemeClr val="lt1"/>
-          </a:fontRef>
-        </p:style>
-        <p:txBody>
-          <a:bodyPr rtlCol="0" anchor="ctr"/>
-          <a:lstStyle/>
-          <a:p>
-            <a:pPr algn="ctr"/>
-            <a:endParaRPr lang="en-US"/>
+            <a:r>
+              <a:rPr lang="en-GB" dirty="0"/>
+              <a:t>	100/8 = 12.5</a:t>
+            </a:r>
           </a:p>
         </p:txBody>
       </p:sp>
     </p:spTree>
     <p:extLst>
       <p:ext uri="{BB962C8B-B14F-4D97-AF65-F5344CB8AC3E}">
-        <p14:creationId xmlns:p14="http://schemas.microsoft.com/office/powerpoint/2010/main" val="2653211012"/>
+        <p14:creationId xmlns:p14="http://schemas.microsoft.com/office/powerpoint/2010/main" val="2379956208"/>
       </p:ext>
     </p:extLst>
   </p:cSld>
@@ -7737,7 +7711,7 @@
         </p:spPr>
         <p:txBody>
           <a:bodyPr>
-            <a:normAutofit fontScale="92500" lnSpcReduction="10000"/>
+            <a:normAutofit/>
           </a:bodyPr>
           <a:lstStyle/>
           <a:p>
@@ -7803,6 +7777,35 @@
             </a:r>
           </a:p>
           <a:p>
+            <a:pPr marL="457200" lvl="1" indent="0">
+              <a:buNone/>
+            </a:pPr>
+            <a:endParaRPr lang="en-GB" dirty="0"/>
+          </a:p>
+          <a:p>
+            <a:pPr lvl="1"/>
+            <a:r>
+              <a:rPr lang="en-GB" dirty="0"/>
+              <a:t>SUS measures both </a:t>
+            </a:r>
+            <a:r>
+              <a:rPr lang="en-GB" b="1" dirty="0"/>
+              <a:t>learnability</a:t>
+            </a:r>
+            <a:r>
+              <a:rPr lang="en-GB" dirty="0"/>
+              <a:t> and </a:t>
+            </a:r>
+            <a:r>
+              <a:rPr lang="en-GB" b="1" dirty="0"/>
+              <a:t>usability</a:t>
+            </a:r>
+            <a:r>
+              <a:rPr lang="en-GB" dirty="0"/>
+              <a:t>.</a:t>
+            </a:r>
+          </a:p>
+          <a:p>
             <a:pPr lvl="1"/>
             <a:endParaRPr lang="en-GB" dirty="0"/>
           </a:p>
@@ -7810,52 +7813,6 @@
             <a:pPr lvl="1"/>
             <a:r>
               <a:rPr lang="en-GB" dirty="0"/>
-              <a:t>SUS </a:t>
-            </a:r>
-            <a:r>
-              <a:rPr lang="en-GB" b="1" dirty="0"/>
-              <a:t>scores are not percentages</a:t>
-            </a:r>
-            <a:r>
-              <a:rPr lang="en-GB" dirty="0"/>
-              <a:t>, despite returning a value between 0 and 100. To understand how your product compares to others, you need to look at its percentile ranking.</a:t>
-            </a:r>
-          </a:p>
-          <a:p>
-            <a:pPr lvl="1"/>
-            <a:endParaRPr lang="en-GB" dirty="0"/>
-          </a:p>
-          <a:p>
-            <a:pPr lvl="1"/>
-            <a:r>
-              <a:rPr lang="en-GB" dirty="0"/>
-              <a:t>SUS measures both </a:t>
-            </a:r>
-            <a:r>
-              <a:rPr lang="en-GB" b="1" dirty="0"/>
-              <a:t>learnability</a:t>
-            </a:r>
-            <a:r>
-              <a:rPr lang="en-GB" dirty="0"/>
-              <a:t> and </a:t>
-            </a:r>
-            <a:r>
-              <a:rPr lang="en-GB" b="1" dirty="0"/>
-              <a:t>usability</a:t>
-            </a:r>
-            <a:r>
-              <a:rPr lang="en-GB" dirty="0"/>
-              <a:t>.</a:t>
-            </a:r>
-          </a:p>
-          <a:p>
-            <a:pPr lvl="1"/>
-            <a:endParaRPr lang="en-GB" dirty="0"/>
-          </a:p>
-          <a:p>
-            <a:pPr lvl="1"/>
-            <a:r>
-              <a:rPr lang="en-GB" dirty="0"/>
               <a:t>SUS scores have a </a:t>
             </a:r>
             <a:r>
@@ -7864,7 +7821,7 @@
             </a:r>
             <a:r>
               <a:rPr lang="en-GB" dirty="0"/>
-              <a:t>, but it is not surprising that people’s subjective assessments may not be consistent with whether or not they were successful using a system.</a:t>
+              <a:t>, but it is not surprising that people’s subjective assessments may not be consistent with whether they were successful using a system.</a:t>
             </a:r>
           </a:p>
         </p:txBody>
@@ -8770,7 +8727,7 @@
           <a:p>
             <a:r>
               <a:rPr lang="en-GB" dirty="0"/>
-              <a:t>The best approach for constructing a CI around numeric rating scales is to compute the mean and standard deviation of the responses then use the </a:t>
+              <a:t>The best approach for constructing a CI around numeric rating scales is to compute the mean and standard deviation of the responses and then use the </a:t>
             </a:r>
             <a:r>
               <a:rPr lang="en-GB" b="1" dirty="0"/>
@@ -8796,7 +8753,15 @@
           <a:p>
             <a:r>
               <a:rPr lang="en-GB" dirty="0"/>
-              <a:t>The t-distribution adjusts for how good our estimate is by making the intervals wider as the sample sizes get smaller. </a:t>
+              <a:t>The t-distribution </a:t>
+            </a:r>
+            <a:r>
+              <a:rPr lang="en-GB" b="1" dirty="0"/>
+              <a:t>adjusts</a:t>
+            </a:r>
+            <a:r>
+              <a:rPr lang="en-GB" dirty="0"/>
+              <a:t> for how good our estimate is by making the intervals wider as the sample sizes get smaller. </a:t>
             </a:r>
           </a:p>
           <a:p>
@@ -9181,8 +9146,8 @@
           </a:p>
         </p:txBody>
       </p:sp>
-      <mc:AlternateContent xmlns:mc="http://schemas.openxmlformats.org/markup-compatibility/2006">
-        <mc:Choice xmlns:a14="http://schemas.microsoft.com/office/drawing/2010/main" Requires="a14">
+      <mc:AlternateContent xmlns:mc="http://schemas.openxmlformats.org/markup-compatibility/2006" xmlns:a14="http://schemas.microsoft.com/office/drawing/2010/main">
+        <mc:Choice Requires="a14">
           <p:sp>
             <p:nvSpPr>
               <p:cNvPr id="3" name="Segnaposto contenuto 2">
@@ -9292,7 +9257,7 @@
             </p:txBody>
           </p:sp>
         </mc:Choice>
-        <mc:Fallback>
+        <mc:Fallback xmlns="">
           <p:sp>
             <p:nvSpPr>
               <p:cNvPr id="3" name="Segnaposto contenuto 2">
@@ -11176,6 +11141,301 @@
           </p:sp>
         </mc:Fallback>
       </mc:AlternateContent>
+      <mc:AlternateContent xmlns:mc="http://schemas.openxmlformats.org/markup-compatibility/2006">
+        <mc:Choice xmlns:a14="http://schemas.microsoft.com/office/drawing/2010/main" Requires="a14">
+          <p:sp>
+            <p:nvSpPr>
+              <p:cNvPr id="7" name="TextBox 6">
+                <a:extLst>
+                  <a:ext uri="{FF2B5EF4-FFF2-40B4-BE49-F238E27FC236}">
+                    <a16:creationId xmlns:a16="http://schemas.microsoft.com/office/drawing/2014/main" id="{A48F9AA9-B307-823A-30B6-2D594E80C9C1}"/>
+                  </a:ext>
+                </a:extLst>
+              </p:cNvPr>
+              <p:cNvSpPr txBox="1"/>
+              <p:nvPr/>
+            </p:nvSpPr>
+            <p:spPr>
+              <a:xfrm>
+                <a:off x="4846663" y="2384795"/>
+                <a:ext cx="2430665" cy="1077603"/>
+              </a:xfrm>
+              <a:prstGeom prst="rect">
+                <a:avLst/>
+              </a:prstGeom>
+              <a:noFill/>
+            </p:spPr>
+            <p:txBody>
+              <a:bodyPr wrap="none" lIns="0" tIns="0" rIns="0" bIns="0" rtlCol="0">
+                <a:spAutoFit/>
+              </a:bodyPr>
+              <a:lstStyle/>
+              <a:p>
+                <a14:m>
+                  <m:oMathPara xmlns:m="http://schemas.openxmlformats.org/officeDocument/2006/math">
+                    <m:oMathParaPr>
+                      <m:jc m:val="centerGroup"/>
+                    </m:oMathParaPr>
+                    <m:oMath xmlns:m="http://schemas.openxmlformats.org/officeDocument/2006/math">
+                      <m:r>
+                        <a:rPr lang="en-US" b="0" i="1" smtClean="0">
+                          <a:latin typeface="Cambria Math" panose="02040503050406030204" pitchFamily="18" charset="0"/>
+                        </a:rPr>
+                        <m:t>𝑠</m:t>
+                      </m:r>
+                      <m:r>
+                        <a:rPr lang="en-US" b="0" i="1" smtClean="0">
+                          <a:latin typeface="Cambria Math" panose="02040503050406030204" pitchFamily="18" charset="0"/>
+                        </a:rPr>
+                        <m:t>=</m:t>
+                      </m:r>
+                      <m:rad>
+                        <m:radPr>
+                          <m:degHide m:val="on"/>
+                          <m:ctrlPr>
+                            <a:rPr lang="en-US" b="0" i="1" smtClean="0">
+                              <a:latin typeface="Cambria Math" panose="02040503050406030204" pitchFamily="18" charset="0"/>
+                            </a:rPr>
+                          </m:ctrlPr>
+                        </m:radPr>
+                        <m:deg/>
+                        <m:e>
+                          <m:f>
+                            <m:fPr>
+                              <m:ctrlPr>
+                                <a:rPr lang="en-US" b="0" i="1" smtClean="0">
+                                  <a:latin typeface="Cambria Math" panose="02040503050406030204" pitchFamily="18" charset="0"/>
+                                </a:rPr>
+                              </m:ctrlPr>
+                            </m:fPr>
+                            <m:num>
+                              <m:r>
+                                <a:rPr lang="en-US" b="0" i="1" smtClean="0">
+                                  <a:latin typeface="Cambria Math" panose="02040503050406030204" pitchFamily="18" charset="0"/>
+                                </a:rPr>
+                                <m:t>1</m:t>
+                              </m:r>
+                            </m:num>
+                            <m:den>
+                              <m:r>
+                                <a:rPr lang="en-US" b="0" i="1" smtClean="0">
+                                  <a:latin typeface="Cambria Math" panose="02040503050406030204" pitchFamily="18" charset="0"/>
+                                </a:rPr>
+                                <m:t>𝑛</m:t>
+                              </m:r>
+                              <m:r>
+                                <a:rPr lang="en-US" b="0" i="1" smtClean="0">
+                                  <a:latin typeface="Cambria Math" panose="02040503050406030204" pitchFamily="18" charset="0"/>
+                                </a:rPr>
+                                <m:t>−1</m:t>
+                              </m:r>
+                            </m:den>
+                          </m:f>
+                          <m:nary>
+                            <m:naryPr>
+                              <m:chr m:val="∑"/>
+                              <m:ctrlPr>
+                                <a:rPr lang="en-US" b="0" i="1" smtClean="0">
+                                  <a:latin typeface="Cambria Math" panose="02040503050406030204" pitchFamily="18" charset="0"/>
+                                </a:rPr>
+                              </m:ctrlPr>
+                            </m:naryPr>
+                            <m:sub>
+                              <m:r>
+                                <m:rPr>
+                                  <m:brk m:alnAt="23"/>
+                                </m:rPr>
+                                <a:rPr lang="en-US" b="0" i="1" smtClean="0">
+                                  <a:latin typeface="Cambria Math" panose="02040503050406030204" pitchFamily="18" charset="0"/>
+                                </a:rPr>
+                                <m:t>1</m:t>
+                              </m:r>
+                            </m:sub>
+                            <m:sup>
+                              <m:r>
+                                <a:rPr lang="en-US" b="0" i="1" smtClean="0">
+                                  <a:latin typeface="Cambria Math" panose="02040503050406030204" pitchFamily="18" charset="0"/>
+                                </a:rPr>
+                                <m:t>𝑛</m:t>
+                              </m:r>
+                            </m:sup>
+                            <m:e>
+                              <m:r>
+                                <a:rPr lang="en-US" b="0" i="1" smtClean="0">
+                                  <a:latin typeface="Cambria Math" panose="02040503050406030204" pitchFamily="18" charset="0"/>
+                                </a:rPr>
+                                <m:t>(</m:t>
+                              </m:r>
+                              <m:sSub>
+                                <m:sSubPr>
+                                  <m:ctrlPr>
+                                    <a:rPr lang="en-US" b="0" i="1" smtClean="0">
+                                      <a:latin typeface="Cambria Math" panose="02040503050406030204" pitchFamily="18" charset="0"/>
+                                    </a:rPr>
+                                  </m:ctrlPr>
+                                </m:sSubPr>
+                                <m:e>
+                                  <m:r>
+                                    <a:rPr lang="en-US" b="0" i="1" smtClean="0">
+                                      <a:latin typeface="Cambria Math" panose="02040503050406030204" pitchFamily="18" charset="0"/>
+                                    </a:rPr>
+                                    <m:t>𝑥</m:t>
+                                  </m:r>
+                                </m:e>
+                                <m:sub>
+                                  <m:r>
+                                    <a:rPr lang="en-US" b="0" i="1" smtClean="0">
+                                      <a:latin typeface="Cambria Math" panose="02040503050406030204" pitchFamily="18" charset="0"/>
+                                    </a:rPr>
+                                    <m:t>𝑖</m:t>
+                                  </m:r>
+                                </m:sub>
+                              </m:sSub>
+                              <m:r>
+                                <a:rPr lang="en-US" b="0" i="1" smtClean="0">
+                                  <a:latin typeface="Cambria Math" panose="02040503050406030204" pitchFamily="18" charset="0"/>
+                                </a:rPr>
+                                <m:t>−</m:t>
+                              </m:r>
+                              <m:acc>
+                                <m:accPr>
+                                  <m:chr m:val="̅"/>
+                                  <m:ctrlPr>
+                                    <a:rPr lang="en-US" b="0" i="1" smtClean="0">
+                                      <a:latin typeface="Cambria Math" panose="02040503050406030204" pitchFamily="18" charset="0"/>
+                                    </a:rPr>
+                                  </m:ctrlPr>
+                                </m:accPr>
+                                <m:e>
+                                  <m:r>
+                                    <a:rPr lang="en-US" b="0" i="1" smtClean="0">
+                                      <a:latin typeface="Cambria Math" panose="02040503050406030204" pitchFamily="18" charset="0"/>
+                                    </a:rPr>
+                                    <m:t>𝑥</m:t>
+                                  </m:r>
+                                </m:e>
+                              </m:acc>
+                              <m:sSup>
+                                <m:sSupPr>
+                                  <m:ctrlPr>
+                                    <a:rPr lang="en-US" b="0" i="1" smtClean="0">
+                                      <a:latin typeface="Cambria Math" panose="02040503050406030204" pitchFamily="18" charset="0"/>
+                                    </a:rPr>
+                                  </m:ctrlPr>
+                                </m:sSupPr>
+                                <m:e>
+                                  <m:r>
+                                    <a:rPr lang="en-US" b="0" i="1" smtClean="0">
+                                      <a:latin typeface="Cambria Math" panose="02040503050406030204" pitchFamily="18" charset="0"/>
+                                    </a:rPr>
+                                    <m:t>)</m:t>
+                                  </m:r>
+                                </m:e>
+                                <m:sup>
+                                  <m:r>
+                                    <a:rPr lang="en-US" b="0" i="1" smtClean="0">
+                                      <a:latin typeface="Cambria Math" panose="02040503050406030204" pitchFamily="18" charset="0"/>
+                                    </a:rPr>
+                                    <m:t>2</m:t>
+                                  </m:r>
+                                </m:sup>
+                              </m:sSup>
+                            </m:e>
+                          </m:nary>
+                        </m:e>
+                      </m:rad>
+                    </m:oMath>
+                  </m:oMathPara>
+                </a14:m>
+                <a:endParaRPr lang="en-US" dirty="0"/>
+              </a:p>
+            </p:txBody>
+          </p:sp>
+        </mc:Choice>
+        <mc:Fallback>
+          <p:sp>
+            <p:nvSpPr>
+              <p:cNvPr id="7" name="TextBox 6">
+                <a:extLst>
+                  <a:ext uri="{FF2B5EF4-FFF2-40B4-BE49-F238E27FC236}">
+                    <a16:creationId xmlns:a16="http://schemas.microsoft.com/office/drawing/2014/main" id="{A48F9AA9-B307-823A-30B6-2D594E80C9C1}"/>
+                  </a:ext>
+                </a:extLst>
+              </p:cNvPr>
+              <p:cNvSpPr txBox="1">
+                <a:spLocks noRot="1" noChangeAspect="1" noMove="1" noResize="1" noEditPoints="1" noAdjustHandles="1" noChangeArrowheads="1" noChangeShapeType="1" noTextEdit="1"/>
+              </p:cNvSpPr>
+              <p:nvPr/>
+            </p:nvSpPr>
+            <p:spPr>
+              <a:xfrm>
+                <a:off x="4846663" y="2384795"/>
+                <a:ext cx="2430665" cy="1077603"/>
+              </a:xfrm>
+              <a:prstGeom prst="rect">
+                <a:avLst/>
+              </a:prstGeom>
+              <a:blipFill>
+                <a:blip r:embed="rId8"/>
+                <a:stretch>
+                  <a:fillRect l="-1036" t="-66279" b="-112791"/>
+                </a:stretch>
+              </a:blipFill>
+            </p:spPr>
+            <p:txBody>
+              <a:bodyPr/>
+              <a:lstStyle/>
+              <a:p>
+                <a:r>
+                  <a:rPr lang="en-US">
+                    <a:noFill/>
+                  </a:rPr>
+                  <a:t> </a:t>
+                </a:r>
+              </a:p>
+            </p:txBody>
+          </p:sp>
+        </mc:Fallback>
+      </mc:AlternateContent>
+      <p:cxnSp>
+        <p:nvCxnSpPr>
+          <p:cNvPr id="11" name="Straight Arrow Connector 10">
+            <a:extLst>
+              <a:ext uri="{FF2B5EF4-FFF2-40B4-BE49-F238E27FC236}">
+                <a16:creationId xmlns:a16="http://schemas.microsoft.com/office/drawing/2014/main" id="{C9C511C2-97F1-BF68-1BAA-FF310C144791}"/>
+              </a:ext>
+            </a:extLst>
+          </p:cNvPr>
+          <p:cNvCxnSpPr/>
+          <p:nvPr/>
+        </p:nvCxnSpPr>
+        <p:spPr>
+          <a:xfrm flipV="1">
+            <a:off x="3677692" y="3011162"/>
+            <a:ext cx="1094396" cy="943592"/>
+          </a:xfrm>
+          <a:prstGeom prst="straightConnector1">
+            <a:avLst/>
+          </a:prstGeom>
+          <a:ln>
+            <a:tailEnd type="triangle"/>
+          </a:ln>
+        </p:spPr>
+        <p:style>
+          <a:lnRef idx="1">
+            <a:schemeClr val="dk1"/>
+          </a:lnRef>
+          <a:fillRef idx="0">
+            <a:schemeClr val="dk1"/>
+          </a:fillRef>
+          <a:effectRef idx="0">
+            <a:schemeClr val="dk1"/>
+          </a:effectRef>
+          <a:fontRef idx="minor">
+            <a:schemeClr val="tx1"/>
+          </a:fontRef>
+        </p:style>
+      </p:cxnSp>
     </p:spTree>
     <p:extLst>
       <p:ext uri="{BB962C8B-B14F-4D97-AF65-F5344CB8AC3E}">
@@ -12487,8 +12747,8 @@
           </a:p>
         </p:txBody>
       </p:sp>
-      <mc:AlternateContent xmlns:mc="http://schemas.openxmlformats.org/markup-compatibility/2006">
-        <mc:Choice xmlns:a14="http://schemas.microsoft.com/office/drawing/2010/main" Requires="a14">
+      <mc:AlternateContent xmlns:mc="http://schemas.openxmlformats.org/markup-compatibility/2006" xmlns:a14="http://schemas.microsoft.com/office/drawing/2010/main">
+        <mc:Choice Requires="a14">
           <p:sp>
             <p:nvSpPr>
               <p:cNvPr id="5" name="TextBox 4">
@@ -12632,7 +12892,7 @@
             </p:txBody>
           </p:sp>
         </mc:Choice>
-        <mc:Fallback>
+        <mc:Fallback xmlns="">
           <p:sp>
             <p:nvSpPr>
               <p:cNvPr id="5" name="TextBox 4">
@@ -12677,8 +12937,8 @@
           </p:sp>
         </mc:Fallback>
       </mc:AlternateContent>
-      <mc:AlternateContent xmlns:mc="http://schemas.openxmlformats.org/markup-compatibility/2006">
-        <mc:Choice xmlns:a14="http://schemas.microsoft.com/office/drawing/2010/main" Requires="a14">
+      <mc:AlternateContent xmlns:mc="http://schemas.openxmlformats.org/markup-compatibility/2006" xmlns:a14="http://schemas.microsoft.com/office/drawing/2010/main">
+        <mc:Choice Requires="a14">
           <p:sp>
             <p:nvSpPr>
               <p:cNvPr id="6" name="Segnaposto contenuto 2">
@@ -12956,7 +13216,7 @@
             </p:txBody>
           </p:sp>
         </mc:Choice>
-        <mc:Fallback>
+        <mc:Fallback xmlns="">
           <p:sp>
             <p:nvSpPr>
               <p:cNvPr id="6" name="Segnaposto contenuto 2">

</xml_diff>

<commit_message>
[master] fixed slides theory 11 - Thanks bobo05272
</commit_message>
<xml_diff>
--- a/theory_11-usability_evaluation/theory_11-usability_evaluation.pptx
+++ b/theory_11-usability_evaluation/theory_11-usability_evaluation.pptx
@@ -234,7 +234,7 @@
           <a:p>
             <a:fld id="{251090E0-FB0C-49E9-9864-9F53EABEA96F}" type="datetimeFigureOut">
               <a:rPr lang="en-GB" smtClean="0"/>
-              <a:t>06/05/2024</a:t>
+              <a:t>14/06/2024</a:t>
             </a:fld>
             <a:endParaRPr lang="en-GB"/>
           </a:p>
@@ -4066,7 +4066,7 @@
             </a:pPr>
             <a:r>
               <a:rPr lang="en-GB" dirty="0"/>
-              <a:t>(3-1) + (4-1) + (4-1) + (3-1) + (5-1) = 16</a:t>
+              <a:t>(3-1) + (4-1) + (4-1) + (3-1) + (5-1) = 14</a:t>
             </a:r>
           </a:p>
           <a:p>
@@ -4117,11 +4117,11 @@
             </a:pPr>
             <a:r>
               <a:rPr lang="en-GB" dirty="0"/>
-              <a:t>(16 + 15) x 2.5 = </a:t>
+              <a:t>(14 + 15) x 2.5 = </a:t>
             </a:r>
             <a:r>
               <a:rPr lang="en-GB" b="1" dirty="0"/>
-              <a:t>77.5</a:t>
+              <a:t>72.5</a:t>
             </a:r>
           </a:p>
         </p:txBody>
@@ -5182,7 +5182,7 @@
             </a:pPr>
             <a:r>
               <a:rPr lang="en-GB" dirty="0"/>
-              <a:t>(3-1) + (4-1) + (4-1) + (3-1) + (5-1) = 16</a:t>
+              <a:t>(3-1) + (4-1) + (4-1) + (3-1) + (5-1) = 14</a:t>
             </a:r>
           </a:p>
           <a:p>
@@ -5233,11 +5233,11 @@
             </a:pPr>
             <a:r>
               <a:rPr lang="en-GB" dirty="0"/>
-              <a:t>(16 + 9) x 3.125 = </a:t>
+              <a:t>(14 + 9) x 3.125 = </a:t>
             </a:r>
             <a:r>
               <a:rPr lang="en-GB" b="1" dirty="0"/>
-              <a:t>78.125</a:t>
+              <a:t>71.875</a:t>
             </a:r>
           </a:p>
         </p:txBody>
@@ -13446,7 +13446,7 @@
             <a:pPr lvl="1"/>
             <a:r>
               <a:rPr lang="en-GB" dirty="0"/>
-              <a:t>Mean of differences = 7.4</a:t>
+              <a:t>Mean of differences = 7.2</a:t>
             </a:r>
           </a:p>
           <a:p>
@@ -13507,8 +13507,8 @@
           </a:prstGeom>
         </p:spPr>
       </p:pic>
-      <mc:AlternateContent xmlns:mc="http://schemas.openxmlformats.org/markup-compatibility/2006" xmlns:a14="http://schemas.microsoft.com/office/drawing/2010/main">
-        <mc:Choice Requires="a14">
+      <mc:AlternateContent xmlns:mc="http://schemas.openxmlformats.org/markup-compatibility/2006">
+        <mc:Choice xmlns:a14="http://schemas.microsoft.com/office/drawing/2010/main" Requires="a14">
           <p:sp>
             <p:nvSpPr>
               <p:cNvPr id="6" name="TextBox 5">
@@ -13663,7 +13663,13 @@
                             <a:rPr lang="en-US" sz="2000" b="0" i="1" smtClean="0">
                               <a:latin typeface="Cambria Math" panose="02040503050406030204" pitchFamily="18" charset="0"/>
                             </a:rPr>
-                            <m:t>7.4</m:t>
+                            <m:t>7.</m:t>
+                          </m:r>
+                          <m:r>
+                            <a:rPr lang="en-US" sz="2000" b="0" i="1" smtClean="0">
+                              <a:latin typeface="Cambria Math" panose="02040503050406030204" pitchFamily="18" charset="0"/>
+                            </a:rPr>
+                            <m:t>2</m:t>
                           </m:r>
                         </m:num>
                         <m:den>
@@ -13680,7 +13686,19 @@
                                 <a:rPr lang="en-US" sz="2000" b="0" i="1" smtClean="0">
                                   <a:latin typeface="Cambria Math" panose="02040503050406030204" pitchFamily="18" charset="0"/>
                                 </a:rPr>
-                                <m:t>5.46</m:t>
+                                <m:t>5.</m:t>
+                              </m:r>
+                              <m:r>
+                                <a:rPr lang="en-US" sz="2000" b="0" i="1" smtClean="0">
+                                  <a:latin typeface="Cambria Math" panose="02040503050406030204" pitchFamily="18" charset="0"/>
+                                </a:rPr>
+                                <m:t>2</m:t>
+                              </m:r>
+                              <m:r>
+                                <a:rPr lang="en-US" sz="2000" b="0" i="1" smtClean="0">
+                                  <a:latin typeface="Cambria Math" panose="02040503050406030204" pitchFamily="18" charset="0"/>
+                                </a:rPr>
+                                <m:t>6</m:t>
                               </m:r>
                             </m:num>
                             <m:den>
@@ -13726,7 +13744,13 @@
                             <a:rPr lang="en-US" sz="2000" b="0" i="1" smtClean="0">
                               <a:latin typeface="Cambria Math" panose="02040503050406030204" pitchFamily="18" charset="0"/>
                             </a:rPr>
-                            <m:t>7.4</m:t>
+                            <m:t>7.</m:t>
+                          </m:r>
+                          <m:r>
+                            <a:rPr lang="en-US" sz="2000" b="0" i="1" smtClean="0">
+                              <a:latin typeface="Cambria Math" panose="02040503050406030204" pitchFamily="18" charset="0"/>
+                            </a:rPr>
+                            <m:t>2</m:t>
                           </m:r>
                         </m:num>
                         <m:den>
@@ -13734,7 +13758,13 @@
                             <a:rPr lang="en-US" sz="2000" b="0" i="1" smtClean="0">
                               <a:latin typeface="Cambria Math" panose="02040503050406030204" pitchFamily="18" charset="0"/>
                             </a:rPr>
-                            <m:t>2.44</m:t>
+                            <m:t>2.</m:t>
+                          </m:r>
+                          <m:r>
+                            <a:rPr lang="en-US" sz="2000" b="0" i="1" smtClean="0">
+                              <a:latin typeface="Cambria Math" panose="02040503050406030204" pitchFamily="18" charset="0"/>
+                            </a:rPr>
+                            <m:t>35</m:t>
                           </m:r>
                         </m:den>
                       </m:f>
@@ -13742,7 +13772,13 @@
                         <a:rPr lang="en-US" sz="2000" b="0" i="1" smtClean="0">
                           <a:latin typeface="Cambria Math" panose="02040503050406030204" pitchFamily="18" charset="0"/>
                         </a:rPr>
-                        <m:t>=3.03</m:t>
+                        <m:t>=3.0</m:t>
+                      </m:r>
+                      <m:r>
+                        <a:rPr lang="en-US" sz="2000" b="0" i="1" smtClean="0">
+                          <a:latin typeface="Cambria Math" panose="02040503050406030204" pitchFamily="18" charset="0"/>
+                        </a:rPr>
+                        <m:t>6</m:t>
                       </m:r>
                     </m:oMath>
                   </m:oMathPara>
@@ -13752,7 +13788,7 @@
             </p:txBody>
           </p:sp>
         </mc:Choice>
-        <mc:Fallback xmlns="">
+        <mc:Fallback>
           <p:sp>
             <p:nvSpPr>
               <p:cNvPr id="6" name="TextBox 5">
@@ -15051,7 +15087,7 @@
               <a:rPr lang="en-GB" dirty="0">
                 <a:latin typeface="Palatino Linotype" panose="02040502050505030304" pitchFamily="18" charset="0"/>
               </a:rPr>
-              <a:t>The usability of app B is statistically better if we consider a level of significance (p-value) greater than ~ 0.05</a:t>
+              <a:t>The usability of app B is statistically better if we consider a level of significance (p-value) greater than ~ 0.10</a:t>
             </a:r>
           </a:p>
           <a:p>
@@ -15108,7 +15144,7 @@
         </p:nvSpPr>
         <p:spPr>
           <a:xfrm>
-            <a:off x="10147859" y="3002145"/>
+            <a:off x="9702851" y="3002145"/>
             <a:ext cx="129986" cy="121380"/>
           </a:xfrm>
           <a:prstGeom prst="ellipse">
@@ -15156,8 +15192,8 @@
         </p:nvCxnSpPr>
         <p:spPr>
           <a:xfrm flipV="1">
-            <a:off x="7209692" y="3123525"/>
-            <a:ext cx="2938167" cy="1511780"/>
+            <a:off x="7209692" y="3118556"/>
+            <a:ext cx="2558152" cy="1516749"/>
           </a:xfrm>
           <a:prstGeom prst="straightConnector1">
             <a:avLst/>
@@ -15181,8 +15217,8 @@
           </a:fontRef>
         </p:style>
       </p:cxnSp>
-      <mc:AlternateContent xmlns:mc="http://schemas.openxmlformats.org/markup-compatibility/2006" xmlns:a14="http://schemas.microsoft.com/office/drawing/2010/main">
-        <mc:Choice Requires="a14">
+      <mc:AlternateContent xmlns:mc="http://schemas.openxmlformats.org/markup-compatibility/2006">
+        <mc:Choice xmlns:a14="http://schemas.microsoft.com/office/drawing/2010/main" Requires="a14">
           <p:sp>
             <p:nvSpPr>
               <p:cNvPr id="5" name="TextBox 4">
@@ -15534,7 +15570,7 @@
                                   <a:rPr lang="en-US" sz="2400" b="0" i="1" smtClean="0">
                                     <a:latin typeface="Cambria Math" panose="02040503050406030204" pitchFamily="18" charset="0"/>
                                   </a:rPr>
-                                  <m:t>91.3</m:t>
+                                  <m:t>107.6</m:t>
                                 </m:r>
                               </m:num>
                               <m:den>
@@ -15614,7 +15650,13 @@
                           <a:rPr lang="en-US" sz="2400" b="0" i="1" smtClean="0">
                             <a:latin typeface="Cambria Math" panose="02040503050406030204" pitchFamily="18" charset="0"/>
                           </a:rPr>
-                          <m:t>.11</m:t>
+                          <m:t>.</m:t>
+                        </m:r>
+                        <m:r>
+                          <a:rPr lang="en-US" sz="2400" b="0" i="1" smtClean="0">
+                            <a:latin typeface="Cambria Math" panose="02040503050406030204" pitchFamily="18" charset="0"/>
+                          </a:rPr>
+                          <m:t>37</m:t>
                         </m:r>
                       </m:den>
                     </m:f>
@@ -15622,7 +15664,25 @@
                       <a:rPr lang="en-US" sz="2400" b="0" i="1" smtClean="0">
                         <a:latin typeface="Cambria Math" panose="02040503050406030204" pitchFamily="18" charset="0"/>
                       </a:rPr>
-                      <m:t>=−2.348=2.348</m:t>
+                      <m:t>=−2.</m:t>
+                    </m:r>
+                    <m:r>
+                      <a:rPr lang="en-US" sz="2400" b="0" i="1" smtClean="0">
+                        <a:latin typeface="Cambria Math" panose="02040503050406030204" pitchFamily="18" charset="0"/>
+                      </a:rPr>
+                      <m:t>235</m:t>
+                    </m:r>
+                    <m:r>
+                      <a:rPr lang="en-US" sz="2400" b="0" i="1" smtClean="0">
+                        <a:latin typeface="Cambria Math" panose="02040503050406030204" pitchFamily="18" charset="0"/>
+                      </a:rPr>
+                      <m:t>=2.</m:t>
+                    </m:r>
+                    <m:r>
+                      <a:rPr lang="en-US" sz="2400" b="0" i="1" smtClean="0">
+                        <a:latin typeface="Cambria Math" panose="02040503050406030204" pitchFamily="18" charset="0"/>
+                      </a:rPr>
+                      <m:t>235</m:t>
                     </m:r>
                   </m:oMath>
                 </a14:m>
@@ -15631,7 +15691,7 @@
             </p:txBody>
           </p:sp>
         </mc:Choice>
-        <mc:Fallback xmlns="">
+        <mc:Fallback>
           <p:sp>
             <p:nvSpPr>
               <p:cNvPr id="5" name="TextBox 4">
@@ -15657,7 +15717,7 @@
               <a:blipFill>
                 <a:blip r:embed="rId3"/>
                 <a:stretch>
-                  <a:fillRect l="-1406" t="-5747"/>
+                  <a:fillRect l="-1406" t="-5747" r="-201"/>
                 </a:stretch>
               </a:blipFill>
             </p:spPr>

</xml_diff>